<commit_message>
Correcion de Diagrama Gantt, DER, Informe
</commit_message>
<xml_diff>
--- a/Documentacion/Presentacion.pptx
+++ b/Documentacion/Presentacion.pptx
@@ -6,10 +6,12 @@
   </p:sldMasterIdLst>
   <p:sldIdLst>
     <p:sldId id="256" r:id="rId2"/>
-    <p:sldId id="257" r:id="rId3"/>
-    <p:sldId id="258" r:id="rId4"/>
-    <p:sldId id="259" r:id="rId5"/>
-    <p:sldId id="260" r:id="rId6"/>
+    <p:sldId id="261" r:id="rId3"/>
+    <p:sldId id="262" r:id="rId4"/>
+    <p:sldId id="257" r:id="rId5"/>
+    <p:sldId id="258" r:id="rId6"/>
+    <p:sldId id="259" r:id="rId7"/>
+    <p:sldId id="260" r:id="rId8"/>
   </p:sldIdLst>
   <p:sldSz cx="12192000" cy="6858000"/>
   <p:notesSz cx="6858000" cy="9144000"/>
@@ -11130,7 +11132,7 @@
               </a:lnSpc>
             </a:pPr>
             <a:r>
-              <a:rPr lang="en-US" sz="5000">
+              <a:rPr lang="en-US" sz="5000" dirty="0">
                 <a:effectLst>
                   <a:glow rad="38100">
                     <a:prstClr val="black">
@@ -11146,9 +11148,142 @@
                   </a:outerShdw>
                 </a:effectLst>
               </a:rPr>
-              <a:t>Proyecto: Diseño e Implementación de Base de Datos Hotelera</a:t>
+              <a:t>Proyecto: </a:t>
             </a:r>
-            <a:endParaRPr lang="en-US" sz="5000"/>
+            <a:r>
+              <a:rPr lang="es-AR" sz="5000" dirty="0">
+                <a:effectLst>
+                  <a:glow rad="38100">
+                    <a:prstClr val="black">
+                      <a:lumMod val="65000"/>
+                      <a:lumOff val="35000"/>
+                      <a:alpha val="50000"/>
+                    </a:prstClr>
+                  </a:glow>
+                  <a:outerShdw blurRad="28575" dist="31750" dir="13200000" algn="tl" rotWithShape="0">
+                    <a:srgbClr val="000000">
+                      <a:alpha val="25000"/>
+                    </a:srgbClr>
+                  </a:outerShdw>
+                </a:effectLst>
+              </a:rPr>
+              <a:t>Diseño</a:t>
+            </a:r>
+            <a:r>
+              <a:rPr lang="en-US" sz="5000" dirty="0">
+                <a:effectLst>
+                  <a:glow rad="38100">
+                    <a:prstClr val="black">
+                      <a:lumMod val="65000"/>
+                      <a:lumOff val="35000"/>
+                      <a:alpha val="50000"/>
+                    </a:prstClr>
+                  </a:glow>
+                  <a:outerShdw blurRad="28575" dist="31750" dir="13200000" algn="tl" rotWithShape="0">
+                    <a:srgbClr val="000000">
+                      <a:alpha val="25000"/>
+                    </a:srgbClr>
+                  </a:outerShdw>
+                </a:effectLst>
+              </a:rPr>
+              <a:t> e </a:t>
+            </a:r>
+            <a:r>
+              <a:rPr lang="es-AR" sz="5000" dirty="0">
+                <a:effectLst>
+                  <a:glow rad="38100">
+                    <a:prstClr val="black">
+                      <a:lumMod val="65000"/>
+                      <a:lumOff val="35000"/>
+                      <a:alpha val="50000"/>
+                    </a:prstClr>
+                  </a:glow>
+                  <a:outerShdw blurRad="28575" dist="31750" dir="13200000" algn="tl" rotWithShape="0">
+                    <a:srgbClr val="000000">
+                      <a:alpha val="25000"/>
+                    </a:srgbClr>
+                  </a:outerShdw>
+                </a:effectLst>
+              </a:rPr>
+              <a:t>Implementación</a:t>
+            </a:r>
+            <a:r>
+              <a:rPr lang="en-US" sz="5000" dirty="0">
+                <a:effectLst>
+                  <a:glow rad="38100">
+                    <a:prstClr val="black">
+                      <a:lumMod val="65000"/>
+                      <a:lumOff val="35000"/>
+                      <a:alpha val="50000"/>
+                    </a:prstClr>
+                  </a:glow>
+                  <a:outerShdw blurRad="28575" dist="31750" dir="13200000" algn="tl" rotWithShape="0">
+                    <a:srgbClr val="000000">
+                      <a:alpha val="25000"/>
+                    </a:srgbClr>
+                  </a:outerShdw>
+                </a:effectLst>
+              </a:rPr>
+              <a:t> de Base de </a:t>
+            </a:r>
+            <a:r>
+              <a:rPr lang="es-AR" sz="5000" dirty="0">
+                <a:effectLst>
+                  <a:glow rad="38100">
+                    <a:prstClr val="black">
+                      <a:lumMod val="65000"/>
+                      <a:lumOff val="35000"/>
+                      <a:alpha val="50000"/>
+                    </a:prstClr>
+                  </a:glow>
+                  <a:outerShdw blurRad="28575" dist="31750" dir="13200000" algn="tl" rotWithShape="0">
+                    <a:srgbClr val="000000">
+                      <a:alpha val="25000"/>
+                    </a:srgbClr>
+                  </a:outerShdw>
+                </a:effectLst>
+              </a:rPr>
+              <a:t>Datos</a:t>
+            </a:r>
+            <a:r>
+              <a:rPr lang="en-US" sz="5000" dirty="0">
+                <a:effectLst>
+                  <a:glow rad="38100">
+                    <a:prstClr val="black">
+                      <a:lumMod val="65000"/>
+                      <a:lumOff val="35000"/>
+                      <a:alpha val="50000"/>
+                    </a:prstClr>
+                  </a:glow>
+                  <a:outerShdw blurRad="28575" dist="31750" dir="13200000" algn="tl" rotWithShape="0">
+                    <a:srgbClr val="000000">
+                      <a:alpha val="25000"/>
+                    </a:srgbClr>
+                  </a:outerShdw>
+                </a:effectLst>
+              </a:rPr>
+              <a:t> </a:t>
+            </a:r>
+            <a:r>
+              <a:rPr lang="es-AR" sz="5000" dirty="0">
+                <a:effectLst>
+                  <a:glow rad="38100">
+                    <a:prstClr val="black">
+                      <a:lumMod val="65000"/>
+                      <a:lumOff val="35000"/>
+                      <a:alpha val="50000"/>
+                    </a:prstClr>
+                  </a:glow>
+                  <a:outerShdw blurRad="28575" dist="31750" dir="13200000" algn="tl" rotWithShape="0">
+                    <a:srgbClr val="000000">
+                      <a:alpha val="25000"/>
+                    </a:srgbClr>
+                  </a:outerShdw>
+                </a:effectLst>
+              </a:rPr>
+              <a:t>Hotelera</a:t>
+            </a:r>
+            <a:endParaRPr lang="es-AR" sz="5000" dirty="0"/>
           </a:p>
         </p:txBody>
       </p:sp>
@@ -11188,7 +11323,7 @@
               <a:buChar char="•"/>
             </a:pPr>
             <a:r>
-              <a:rPr lang="en-US" sz="1600" b="1" dirty="0" err="1">
+              <a:rPr lang="es-AR" sz="1600" b="1" dirty="0">
                 <a:solidFill>
                   <a:schemeClr val="tx1">
                     <a:alpha val="60000"/>
@@ -11209,10 +11344,19 @@
                   </a:outerShdw>
                 </a:effectLst>
               </a:rPr>
-              <a:t>Objetivos</a:t>
+              <a:t>Objetivos: </a:t>
             </a:r>
+          </a:p>
+          <a:p>
+            <a:pPr indent="-228600">
+              <a:lnSpc>
+                <a:spcPct val="110000"/>
+              </a:lnSpc>
+              <a:buFont typeface="Arial" panose="020B0604020202020204" pitchFamily="34" charset="0"/>
+              <a:buChar char="•"/>
+            </a:pPr>
             <a:r>
-              <a:rPr lang="en-US" sz="1600" b="1" dirty="0">
+              <a:rPr lang="es-AR" sz="1600" dirty="0">
                 <a:solidFill>
                   <a:schemeClr val="tx1">
                     <a:alpha val="60000"/>
@@ -11233,7 +11377,7 @@
                   </a:outerShdw>
                 </a:effectLst>
               </a:rPr>
-              <a:t>: </a:t>
+              <a:t>Gestionar clientes, reservas, habitaciones, servicios y personal de varios hoteles.</a:t>
             </a:r>
           </a:p>
           <a:p>
@@ -11245,7 +11389,7 @@
               <a:buChar char="•"/>
             </a:pPr>
             <a:r>
-              <a:rPr lang="en-US" sz="1600" dirty="0" err="1">
+              <a:rPr lang="es-AR" sz="1600" b="1" dirty="0">
                 <a:solidFill>
                   <a:schemeClr val="tx1">
                     <a:alpha val="60000"/>
@@ -11266,378 +11410,9 @@
                   </a:outerShdw>
                 </a:effectLst>
               </a:rPr>
-              <a:t>Gestionar</a:t>
+              <a:t>Tecnología:</a:t>
             </a:r>
-            <a:r>
-              <a:rPr lang="en-US" sz="1600" dirty="0">
-                <a:solidFill>
-                  <a:schemeClr val="tx1">
-                    <a:alpha val="60000"/>
-                  </a:schemeClr>
-                </a:solidFill>
-                <a:effectLst>
-                  <a:glow rad="38100">
-                    <a:prstClr val="black">
-                      <a:lumMod val="50000"/>
-                      <a:lumOff val="50000"/>
-                      <a:alpha val="20000"/>
-                    </a:prstClr>
-                  </a:glow>
-                  <a:outerShdw blurRad="44450" dist="12700" dir="13860000" algn="tl" rotWithShape="0">
-                    <a:srgbClr val="000000">
-                      <a:alpha val="20000"/>
-                    </a:srgbClr>
-                  </a:outerShdw>
-                </a:effectLst>
-              </a:rPr>
-              <a:t> </a:t>
-            </a:r>
-            <a:r>
-              <a:rPr lang="en-US" sz="1600" dirty="0" err="1">
-                <a:solidFill>
-                  <a:schemeClr val="tx1">
-                    <a:alpha val="60000"/>
-                  </a:schemeClr>
-                </a:solidFill>
-                <a:effectLst>
-                  <a:glow rad="38100">
-                    <a:prstClr val="black">
-                      <a:lumMod val="50000"/>
-                      <a:lumOff val="50000"/>
-                      <a:alpha val="20000"/>
-                    </a:prstClr>
-                  </a:glow>
-                  <a:outerShdw blurRad="44450" dist="12700" dir="13860000" algn="tl" rotWithShape="0">
-                    <a:srgbClr val="000000">
-                      <a:alpha val="20000"/>
-                    </a:srgbClr>
-                  </a:outerShdw>
-                </a:effectLst>
-              </a:rPr>
-              <a:t>clientes</a:t>
-            </a:r>
-            <a:r>
-              <a:rPr lang="en-US" sz="1600" dirty="0">
-                <a:solidFill>
-                  <a:schemeClr val="tx1">
-                    <a:alpha val="60000"/>
-                  </a:schemeClr>
-                </a:solidFill>
-                <a:effectLst>
-                  <a:glow rad="38100">
-                    <a:prstClr val="black">
-                      <a:lumMod val="50000"/>
-                      <a:lumOff val="50000"/>
-                      <a:alpha val="20000"/>
-                    </a:prstClr>
-                  </a:glow>
-                  <a:outerShdw blurRad="44450" dist="12700" dir="13860000" algn="tl" rotWithShape="0">
-                    <a:srgbClr val="000000">
-                      <a:alpha val="20000"/>
-                    </a:srgbClr>
-                  </a:outerShdw>
-                </a:effectLst>
-              </a:rPr>
-              <a:t>, </a:t>
-            </a:r>
-            <a:r>
-              <a:rPr lang="en-US" sz="1600" dirty="0" err="1">
-                <a:solidFill>
-                  <a:schemeClr val="tx1">
-                    <a:alpha val="60000"/>
-                  </a:schemeClr>
-                </a:solidFill>
-                <a:effectLst>
-                  <a:glow rad="38100">
-                    <a:prstClr val="black">
-                      <a:lumMod val="50000"/>
-                      <a:lumOff val="50000"/>
-                      <a:alpha val="20000"/>
-                    </a:prstClr>
-                  </a:glow>
-                  <a:outerShdw blurRad="44450" dist="12700" dir="13860000" algn="tl" rotWithShape="0">
-                    <a:srgbClr val="000000">
-                      <a:alpha val="20000"/>
-                    </a:srgbClr>
-                  </a:outerShdw>
-                </a:effectLst>
-              </a:rPr>
-              <a:t>reservas</a:t>
-            </a:r>
-            <a:r>
-              <a:rPr lang="en-US" sz="1600" dirty="0">
-                <a:solidFill>
-                  <a:schemeClr val="tx1">
-                    <a:alpha val="60000"/>
-                  </a:schemeClr>
-                </a:solidFill>
-                <a:effectLst>
-                  <a:glow rad="38100">
-                    <a:prstClr val="black">
-                      <a:lumMod val="50000"/>
-                      <a:lumOff val="50000"/>
-                      <a:alpha val="20000"/>
-                    </a:prstClr>
-                  </a:glow>
-                  <a:outerShdw blurRad="44450" dist="12700" dir="13860000" algn="tl" rotWithShape="0">
-                    <a:srgbClr val="000000">
-                      <a:alpha val="20000"/>
-                    </a:srgbClr>
-                  </a:outerShdw>
-                </a:effectLst>
-              </a:rPr>
-              <a:t>, </a:t>
-            </a:r>
-            <a:r>
-              <a:rPr lang="en-US" sz="1600" dirty="0" err="1">
-                <a:solidFill>
-                  <a:schemeClr val="tx1">
-                    <a:alpha val="60000"/>
-                  </a:schemeClr>
-                </a:solidFill>
-                <a:effectLst>
-                  <a:glow rad="38100">
-                    <a:prstClr val="black">
-                      <a:lumMod val="50000"/>
-                      <a:lumOff val="50000"/>
-                      <a:alpha val="20000"/>
-                    </a:prstClr>
-                  </a:glow>
-                  <a:outerShdw blurRad="44450" dist="12700" dir="13860000" algn="tl" rotWithShape="0">
-                    <a:srgbClr val="000000">
-                      <a:alpha val="20000"/>
-                    </a:srgbClr>
-                  </a:outerShdw>
-                </a:effectLst>
-              </a:rPr>
-              <a:t>habitaciones</a:t>
-            </a:r>
-            <a:r>
-              <a:rPr lang="en-US" sz="1600" dirty="0">
-                <a:solidFill>
-                  <a:schemeClr val="tx1">
-                    <a:alpha val="60000"/>
-                  </a:schemeClr>
-                </a:solidFill>
-                <a:effectLst>
-                  <a:glow rad="38100">
-                    <a:prstClr val="black">
-                      <a:lumMod val="50000"/>
-                      <a:lumOff val="50000"/>
-                      <a:alpha val="20000"/>
-                    </a:prstClr>
-                  </a:glow>
-                  <a:outerShdw blurRad="44450" dist="12700" dir="13860000" algn="tl" rotWithShape="0">
-                    <a:srgbClr val="000000">
-                      <a:alpha val="20000"/>
-                    </a:srgbClr>
-                  </a:outerShdw>
-                </a:effectLst>
-              </a:rPr>
-              <a:t>, </a:t>
-            </a:r>
-            <a:r>
-              <a:rPr lang="en-US" sz="1600" dirty="0" err="1">
-                <a:solidFill>
-                  <a:schemeClr val="tx1">
-                    <a:alpha val="60000"/>
-                  </a:schemeClr>
-                </a:solidFill>
-                <a:effectLst>
-                  <a:glow rad="38100">
-                    <a:prstClr val="black">
-                      <a:lumMod val="50000"/>
-                      <a:lumOff val="50000"/>
-                      <a:alpha val="20000"/>
-                    </a:prstClr>
-                  </a:glow>
-                  <a:outerShdw blurRad="44450" dist="12700" dir="13860000" algn="tl" rotWithShape="0">
-                    <a:srgbClr val="000000">
-                      <a:alpha val="20000"/>
-                    </a:srgbClr>
-                  </a:outerShdw>
-                </a:effectLst>
-              </a:rPr>
-              <a:t>servicios</a:t>
-            </a:r>
-            <a:r>
-              <a:rPr lang="en-US" sz="1600" dirty="0">
-                <a:solidFill>
-                  <a:schemeClr val="tx1">
-                    <a:alpha val="60000"/>
-                  </a:schemeClr>
-                </a:solidFill>
-                <a:effectLst>
-                  <a:glow rad="38100">
-                    <a:prstClr val="black">
-                      <a:lumMod val="50000"/>
-                      <a:lumOff val="50000"/>
-                      <a:alpha val="20000"/>
-                    </a:prstClr>
-                  </a:glow>
-                  <a:outerShdw blurRad="44450" dist="12700" dir="13860000" algn="tl" rotWithShape="0">
-                    <a:srgbClr val="000000">
-                      <a:alpha val="20000"/>
-                    </a:srgbClr>
-                  </a:outerShdw>
-                </a:effectLst>
-              </a:rPr>
-              <a:t> y personal de </a:t>
-            </a:r>
-            <a:r>
-              <a:rPr lang="en-US" sz="1600" dirty="0" err="1">
-                <a:solidFill>
-                  <a:schemeClr val="tx1">
-                    <a:alpha val="60000"/>
-                  </a:schemeClr>
-                </a:solidFill>
-                <a:effectLst>
-                  <a:glow rad="38100">
-                    <a:prstClr val="black">
-                      <a:lumMod val="50000"/>
-                      <a:lumOff val="50000"/>
-                      <a:alpha val="20000"/>
-                    </a:prstClr>
-                  </a:glow>
-                  <a:outerShdw blurRad="44450" dist="12700" dir="13860000" algn="tl" rotWithShape="0">
-                    <a:srgbClr val="000000">
-                      <a:alpha val="20000"/>
-                    </a:srgbClr>
-                  </a:outerShdw>
-                </a:effectLst>
-              </a:rPr>
-              <a:t>varios</a:t>
-            </a:r>
-            <a:r>
-              <a:rPr lang="en-US" sz="1600" dirty="0">
-                <a:solidFill>
-                  <a:schemeClr val="tx1">
-                    <a:alpha val="60000"/>
-                  </a:schemeClr>
-                </a:solidFill>
-                <a:effectLst>
-                  <a:glow rad="38100">
-                    <a:prstClr val="black">
-                      <a:lumMod val="50000"/>
-                      <a:lumOff val="50000"/>
-                      <a:alpha val="20000"/>
-                    </a:prstClr>
-                  </a:glow>
-                  <a:outerShdw blurRad="44450" dist="12700" dir="13860000" algn="tl" rotWithShape="0">
-                    <a:srgbClr val="000000">
-                      <a:alpha val="20000"/>
-                    </a:srgbClr>
-                  </a:outerShdw>
-                </a:effectLst>
-              </a:rPr>
-              <a:t> </a:t>
-            </a:r>
-            <a:r>
-              <a:rPr lang="en-US" sz="1600" dirty="0" err="1">
-                <a:solidFill>
-                  <a:schemeClr val="tx1">
-                    <a:alpha val="60000"/>
-                  </a:schemeClr>
-                </a:solidFill>
-                <a:effectLst>
-                  <a:glow rad="38100">
-                    <a:prstClr val="black">
-                      <a:lumMod val="50000"/>
-                      <a:lumOff val="50000"/>
-                      <a:alpha val="20000"/>
-                    </a:prstClr>
-                  </a:glow>
-                  <a:outerShdw blurRad="44450" dist="12700" dir="13860000" algn="tl" rotWithShape="0">
-                    <a:srgbClr val="000000">
-                      <a:alpha val="20000"/>
-                    </a:srgbClr>
-                  </a:outerShdw>
-                </a:effectLst>
-              </a:rPr>
-              <a:t>hoteles</a:t>
-            </a:r>
-            <a:r>
-              <a:rPr lang="en-US" sz="1600" dirty="0">
-                <a:solidFill>
-                  <a:schemeClr val="tx1">
-                    <a:alpha val="60000"/>
-                  </a:schemeClr>
-                </a:solidFill>
-                <a:effectLst>
-                  <a:glow rad="38100">
-                    <a:prstClr val="black">
-                      <a:lumMod val="50000"/>
-                      <a:lumOff val="50000"/>
-                      <a:alpha val="20000"/>
-                    </a:prstClr>
-                  </a:glow>
-                  <a:outerShdw blurRad="44450" dist="12700" dir="13860000" algn="tl" rotWithShape="0">
-                    <a:srgbClr val="000000">
-                      <a:alpha val="20000"/>
-                    </a:srgbClr>
-                  </a:outerShdw>
-                </a:effectLst>
-              </a:rPr>
-              <a:t>.</a:t>
-            </a:r>
-          </a:p>
-          <a:p>
-            <a:pPr indent="-228600">
-              <a:lnSpc>
-                <a:spcPct val="110000"/>
-              </a:lnSpc>
-              <a:buFont typeface="Arial" panose="020B0604020202020204" pitchFamily="34" charset="0"/>
-              <a:buChar char="•"/>
-            </a:pPr>
-            <a:r>
-              <a:rPr lang="en-US" sz="1600" b="1" dirty="0" err="1">
-                <a:solidFill>
-                  <a:schemeClr val="tx1">
-                    <a:alpha val="60000"/>
-                  </a:schemeClr>
-                </a:solidFill>
-                <a:effectLst>
-                  <a:glow rad="38100">
-                    <a:prstClr val="black">
-                      <a:lumMod val="50000"/>
-                      <a:lumOff val="50000"/>
-                      <a:alpha val="20000"/>
-                    </a:prstClr>
-                  </a:glow>
-                  <a:outerShdw blurRad="44450" dist="12700" dir="13860000" algn="tl" rotWithShape="0">
-                    <a:srgbClr val="000000">
-                      <a:alpha val="20000"/>
-                    </a:srgbClr>
-                  </a:outerShdw>
-                </a:effectLst>
-              </a:rPr>
-              <a:t>Tecnología</a:t>
-            </a:r>
-            <a:r>
-              <a:rPr lang="en-US" sz="1600" b="1" dirty="0">
-                <a:solidFill>
-                  <a:schemeClr val="tx1">
-                    <a:alpha val="60000"/>
-                  </a:schemeClr>
-                </a:solidFill>
-                <a:effectLst>
-                  <a:glow rad="38100">
-                    <a:prstClr val="black">
-                      <a:lumMod val="50000"/>
-                      <a:lumOff val="50000"/>
-                      <a:alpha val="20000"/>
-                    </a:prstClr>
-                  </a:glow>
-                  <a:outerShdw blurRad="44450" dist="12700" dir="13860000" algn="tl" rotWithShape="0">
-                    <a:srgbClr val="000000">
-                      <a:alpha val="20000"/>
-                    </a:srgbClr>
-                  </a:outerShdw>
-                </a:effectLst>
-              </a:rPr>
-              <a:t>:</a:t>
-            </a:r>
-            <a:endParaRPr lang="en-US" sz="1600" dirty="0">
+            <a:endParaRPr lang="es-AR" sz="1600" dirty="0">
               <a:solidFill>
                 <a:schemeClr val="tx1">
                   <a:alpha val="60000"/>
@@ -11668,7 +11443,7 @@
               <a:buChar char="•"/>
             </a:pPr>
             <a:r>
-              <a:rPr lang="en-US" sz="1600" dirty="0">
+              <a:rPr lang="es-AR" sz="1600" dirty="0">
                 <a:solidFill>
                   <a:schemeClr val="tx1">
                     <a:alpha val="60000"/>
@@ -11689,154 +11464,10 @@
                   </a:outerShdw>
                 </a:effectLst>
               </a:rPr>
-              <a:t>Modelo </a:t>
+              <a:t>Modelo Relacional implementado en </a:t>
             </a:r>
             <a:r>
-              <a:rPr lang="en-US" sz="1600" dirty="0" err="1">
-                <a:solidFill>
-                  <a:schemeClr val="tx1">
-                    <a:alpha val="60000"/>
-                  </a:schemeClr>
-                </a:solidFill>
-                <a:effectLst>
-                  <a:glow rad="38100">
-                    <a:prstClr val="black">
-                      <a:lumMod val="50000"/>
-                      <a:lumOff val="50000"/>
-                      <a:alpha val="20000"/>
-                    </a:prstClr>
-                  </a:glow>
-                  <a:outerShdw blurRad="44450" dist="12700" dir="13860000" algn="tl" rotWithShape="0">
-                    <a:srgbClr val="000000">
-                      <a:alpha val="20000"/>
-                    </a:srgbClr>
-                  </a:outerShdw>
-                </a:effectLst>
-              </a:rPr>
-              <a:t>Relacional</a:t>
-            </a:r>
-            <a:r>
-              <a:rPr lang="en-US" sz="1600" dirty="0">
-                <a:solidFill>
-                  <a:schemeClr val="tx1">
-                    <a:alpha val="60000"/>
-                  </a:schemeClr>
-                </a:solidFill>
-                <a:effectLst>
-                  <a:glow rad="38100">
-                    <a:prstClr val="black">
-                      <a:lumMod val="50000"/>
-                      <a:lumOff val="50000"/>
-                      <a:alpha val="20000"/>
-                    </a:prstClr>
-                  </a:glow>
-                  <a:outerShdw blurRad="44450" dist="12700" dir="13860000" algn="tl" rotWithShape="0">
-                    <a:srgbClr val="000000">
-                      <a:alpha val="20000"/>
-                    </a:srgbClr>
-                  </a:outerShdw>
-                </a:effectLst>
-              </a:rPr>
-              <a:t> </a:t>
-            </a:r>
-            <a:r>
-              <a:rPr lang="en-US" sz="1600" dirty="0" err="1">
-                <a:solidFill>
-                  <a:schemeClr val="tx1">
-                    <a:alpha val="60000"/>
-                  </a:schemeClr>
-                </a:solidFill>
-                <a:effectLst>
-                  <a:glow rad="38100">
-                    <a:prstClr val="black">
-                      <a:lumMod val="50000"/>
-                      <a:lumOff val="50000"/>
-                      <a:alpha val="20000"/>
-                    </a:prstClr>
-                  </a:glow>
-                  <a:outerShdw blurRad="44450" dist="12700" dir="13860000" algn="tl" rotWithShape="0">
-                    <a:srgbClr val="000000">
-                      <a:alpha val="20000"/>
-                    </a:srgbClr>
-                  </a:outerShdw>
-                </a:effectLst>
-              </a:rPr>
-              <a:t>implementado</a:t>
-            </a:r>
-            <a:r>
-              <a:rPr lang="en-US" sz="1600" dirty="0">
-                <a:solidFill>
-                  <a:schemeClr val="tx1">
-                    <a:alpha val="60000"/>
-                  </a:schemeClr>
-                </a:solidFill>
-                <a:effectLst>
-                  <a:glow rad="38100">
-                    <a:prstClr val="black">
-                      <a:lumMod val="50000"/>
-                      <a:lumOff val="50000"/>
-                      <a:alpha val="20000"/>
-                    </a:prstClr>
-                  </a:glow>
-                  <a:outerShdw blurRad="44450" dist="12700" dir="13860000" algn="tl" rotWithShape="0">
-                    <a:srgbClr val="000000">
-                      <a:alpha val="20000"/>
-                    </a:srgbClr>
-                  </a:outerShdw>
-                </a:effectLst>
-              </a:rPr>
-              <a:t> </a:t>
-            </a:r>
-            <a:r>
-              <a:rPr lang="en-US" sz="1600" dirty="0" err="1">
-                <a:solidFill>
-                  <a:schemeClr val="tx1">
-                    <a:alpha val="60000"/>
-                  </a:schemeClr>
-                </a:solidFill>
-                <a:effectLst>
-                  <a:glow rad="38100">
-                    <a:prstClr val="black">
-                      <a:lumMod val="50000"/>
-                      <a:lumOff val="50000"/>
-                      <a:alpha val="20000"/>
-                    </a:prstClr>
-                  </a:glow>
-                  <a:outerShdw blurRad="44450" dist="12700" dir="13860000" algn="tl" rotWithShape="0">
-                    <a:srgbClr val="000000">
-                      <a:alpha val="20000"/>
-                    </a:srgbClr>
-                  </a:outerShdw>
-                </a:effectLst>
-              </a:rPr>
-              <a:t>en</a:t>
-            </a:r>
-            <a:r>
-              <a:rPr lang="en-US" sz="1600" dirty="0">
-                <a:solidFill>
-                  <a:schemeClr val="tx1">
-                    <a:alpha val="60000"/>
-                  </a:schemeClr>
-                </a:solidFill>
-                <a:effectLst>
-                  <a:glow rad="38100">
-                    <a:prstClr val="black">
-                      <a:lumMod val="50000"/>
-                      <a:lumOff val="50000"/>
-                      <a:alpha val="20000"/>
-                    </a:prstClr>
-                  </a:glow>
-                  <a:outerShdw blurRad="44450" dist="12700" dir="13860000" algn="tl" rotWithShape="0">
-                    <a:srgbClr val="000000">
-                      <a:alpha val="20000"/>
-                    </a:srgbClr>
-                  </a:outerShdw>
-                </a:effectLst>
-              </a:rPr>
-              <a:t> </a:t>
-            </a:r>
-            <a:r>
-              <a:rPr lang="en-US" sz="1600" b="1" dirty="0">
+              <a:rPr lang="es-AR" sz="1600" b="1" dirty="0">
                 <a:solidFill>
                   <a:schemeClr val="tx1">
                     <a:alpha val="60000"/>
@@ -11860,7 +11491,7 @@
               <a:t>MySQL</a:t>
             </a:r>
             <a:r>
-              <a:rPr lang="en-US" sz="1600" dirty="0">
+              <a:rPr lang="es-AR" sz="1600" dirty="0">
                 <a:solidFill>
                   <a:schemeClr val="tx1">
                     <a:alpha val="60000"/>
@@ -11893,7 +11524,7 @@
               <a:buChar char="•"/>
             </a:pPr>
             <a:r>
-              <a:rPr lang="en-US" sz="1600" b="1" dirty="0" err="1">
+              <a:rPr lang="es-AR" sz="1600" b="1" dirty="0">
                 <a:solidFill>
                   <a:schemeClr val="tx1">
                     <a:alpha val="60000"/>
@@ -11914,10 +11545,10 @@
                   </a:outerShdw>
                 </a:effectLst>
               </a:rPr>
-              <a:t>Profesores</a:t>
+              <a:t>Profesores:</a:t>
             </a:r>
             <a:r>
-              <a:rPr lang="en-US" sz="1600" b="1" dirty="0">
+              <a:rPr lang="es-AR" sz="1600" dirty="0">
                 <a:solidFill>
                   <a:schemeClr val="tx1">
                     <a:alpha val="60000"/>
@@ -11938,10 +11569,10 @@
                   </a:outerShdw>
                 </a:effectLst>
               </a:rPr>
-              <a:t>:</a:t>
+              <a:t> Alejandro </a:t>
             </a:r>
             <a:r>
-              <a:rPr lang="en-US" sz="1600" dirty="0">
+              <a:rPr lang="es-AR" sz="1600" dirty="0" err="1">
                 <a:solidFill>
                   <a:schemeClr val="tx1">
                     <a:alpha val="60000"/>
@@ -11962,10 +11593,10 @@
                   </a:outerShdw>
                 </a:effectLst>
               </a:rPr>
-              <a:t> Alejandro Behringer, Juan Carlos </a:t>
+              <a:t>Behringer</a:t>
             </a:r>
             <a:r>
-              <a:rPr lang="en-US" sz="1600" dirty="0" err="1">
+              <a:rPr lang="es-AR" sz="1600" dirty="0">
                 <a:solidFill>
                   <a:schemeClr val="tx1">
                     <a:alpha val="60000"/>
@@ -11986,29 +11617,8 @@
                   </a:outerShdw>
                 </a:effectLst>
               </a:rPr>
-              <a:t>Capia</a:t>
+              <a:t>, Juan Carlos Capia</a:t>
             </a:r>
-            <a:endParaRPr lang="en-US" sz="1600" dirty="0">
-              <a:solidFill>
-                <a:schemeClr val="tx1">
-                  <a:alpha val="60000"/>
-                </a:schemeClr>
-              </a:solidFill>
-              <a:effectLst>
-                <a:glow rad="38100">
-                  <a:prstClr val="black">
-                    <a:lumMod val="50000"/>
-                    <a:lumOff val="50000"/>
-                    <a:alpha val="20000"/>
-                  </a:prstClr>
-                </a:glow>
-                <a:outerShdw blurRad="44450" dist="12700" dir="13860000" algn="tl" rotWithShape="0">
-                  <a:srgbClr val="000000">
-                    <a:alpha val="20000"/>
-                  </a:srgbClr>
-                </a:outerShdw>
-              </a:effectLst>
-            </a:endParaRPr>
           </a:p>
           <a:p>
             <a:pPr indent="-228600">
@@ -12019,7 +11629,7 @@
               <a:buChar char="•"/>
             </a:pPr>
             <a:r>
-              <a:rPr lang="en-US" sz="1600" b="1" dirty="0" err="1">
+              <a:rPr lang="es-AR" sz="1600" b="1" dirty="0">
                 <a:solidFill>
                   <a:schemeClr val="tx1">
                     <a:alpha val="60000"/>
@@ -12040,34 +11650,10 @@
                   </a:outerShdw>
                 </a:effectLst>
               </a:rPr>
-              <a:t>Integrantes</a:t>
+              <a:t>Integrantes:</a:t>
             </a:r>
             <a:r>
-              <a:rPr lang="en-US" sz="1600" b="1" dirty="0">
-                <a:solidFill>
-                  <a:schemeClr val="tx1">
-                    <a:alpha val="60000"/>
-                  </a:schemeClr>
-                </a:solidFill>
-                <a:effectLst>
-                  <a:glow rad="38100">
-                    <a:prstClr val="black">
-                      <a:lumMod val="50000"/>
-                      <a:lumOff val="50000"/>
-                      <a:alpha val="20000"/>
-                    </a:prstClr>
-                  </a:glow>
-                  <a:outerShdw blurRad="44450" dist="12700" dir="13860000" algn="tl" rotWithShape="0">
-                    <a:srgbClr val="000000">
-                      <a:alpha val="20000"/>
-                    </a:srgbClr>
-                  </a:outerShdw>
-                </a:effectLst>
-              </a:rPr>
-              <a:t>:</a:t>
-            </a:r>
-            <a:r>
-              <a:rPr lang="en-US" sz="1600" dirty="0">
+              <a:rPr lang="es-AR" sz="1600" dirty="0">
                 <a:solidFill>
                   <a:schemeClr val="tx1">
                     <a:alpha val="60000"/>
@@ -12280,10 +11866,495 @@
   <p:clrMapOvr>
     <a:masterClrMapping/>
   </p:clrMapOvr>
+  <p:transition spd="slow">
+    <p:wipe/>
+  </p:transition>
 </p:sld>
 </file>
 
 <file path=ppt/slides/slide2.xml><?xml version="1.0" encoding="utf-8"?>
+<p:sld xmlns:a="http://schemas.openxmlformats.org/drawingml/2006/main" xmlns:r="http://schemas.openxmlformats.org/officeDocument/2006/relationships" xmlns:p="http://schemas.openxmlformats.org/presentationml/2006/main">
+  <p:cSld>
+    <p:spTree>
+      <p:nvGrpSpPr>
+        <p:cNvPr id="1" name=""/>
+        <p:cNvGrpSpPr/>
+        <p:nvPr/>
+      </p:nvGrpSpPr>
+      <p:grpSpPr>
+        <a:xfrm>
+          <a:off x="0" y="0"/>
+          <a:ext cx="0" cy="0"/>
+          <a:chOff x="0" y="0"/>
+          <a:chExt cx="0" cy="0"/>
+        </a:xfrm>
+      </p:grpSpPr>
+      <p:pic>
+        <p:nvPicPr>
+          <p:cNvPr id="5" name="Marcador de contenido 4" descr="&#10;">
+            <a:extLst>
+              <a:ext uri="{FF2B5EF4-FFF2-40B4-BE49-F238E27FC236}">
+                <a16:creationId xmlns:a16="http://schemas.microsoft.com/office/drawing/2014/main" id="{F4BAC3D0-75A2-414D-947F-2FFAECF51E0B}"/>
+              </a:ext>
+            </a:extLst>
+          </p:cNvPr>
+          <p:cNvPicPr>
+            <a:picLocks noGrp="1" noChangeAspect="1"/>
+          </p:cNvPicPr>
+          <p:nvPr>
+            <p:ph idx="1"/>
+          </p:nvPr>
+        </p:nvPicPr>
+        <p:blipFill>
+          <a:blip r:embed="rId2">
+            <a:extLst>
+              <a:ext uri="{28A0092B-C50C-407E-A947-70E740481C1C}">
+                <a14:useLocalDpi xmlns:a14="http://schemas.microsoft.com/office/drawing/2010/main" val="0"/>
+              </a:ext>
+            </a:extLst>
+          </a:blip>
+          <a:stretch>
+            <a:fillRect/>
+          </a:stretch>
+        </p:blipFill>
+        <p:spPr>
+          <a:xfrm>
+            <a:off x="550862" y="1564030"/>
+            <a:ext cx="11090275" cy="3425140"/>
+          </a:xfrm>
+          <a:prstGeom prst="roundRect">
+            <a:avLst>
+              <a:gd name="adj" fmla="val 8594"/>
+            </a:avLst>
+          </a:prstGeom>
+          <a:solidFill>
+            <a:srgbClr val="FFFFFF">
+              <a:shade val="85000"/>
+            </a:srgbClr>
+          </a:solidFill>
+          <a:ln>
+            <a:noFill/>
+          </a:ln>
+          <a:effectLst>
+            <a:reflection blurRad="12700" stA="38000" endPos="28000" dist="5000" dir="5400000" sy="-100000" algn="bl" rotWithShape="0"/>
+          </a:effectLst>
+        </p:spPr>
+      </p:pic>
+      <p:sp>
+        <p:nvSpPr>
+          <p:cNvPr id="8" name="CuadroTexto 7">
+            <a:extLst>
+              <a:ext uri="{FF2B5EF4-FFF2-40B4-BE49-F238E27FC236}">
+                <a16:creationId xmlns:a16="http://schemas.microsoft.com/office/drawing/2014/main" id="{92BC5586-6889-4EC2-91D0-C4421EF6A43D}"/>
+              </a:ext>
+            </a:extLst>
+          </p:cNvPr>
+          <p:cNvSpPr txBox="1"/>
+          <p:nvPr/>
+        </p:nvSpPr>
+        <p:spPr>
+          <a:xfrm>
+            <a:off x="550861" y="1194698"/>
+            <a:ext cx="11090275" cy="369332"/>
+          </a:xfrm>
+          <a:prstGeom prst="rect">
+            <a:avLst/>
+          </a:prstGeom>
+          <a:noFill/>
+        </p:spPr>
+        <p:txBody>
+          <a:bodyPr wrap="square" rtlCol="0">
+            <a:spAutoFit/>
+          </a:bodyPr>
+          <a:lstStyle/>
+          <a:p>
+            <a:pPr algn="ctr"/>
+            <a:r>
+              <a:rPr lang="es-AR" dirty="0"/>
+              <a:t>Diagrama Entidad-Relación</a:t>
+            </a:r>
+          </a:p>
+        </p:txBody>
+      </p:sp>
+    </p:spTree>
+    <p:extLst>
+      <p:ext uri="{BB962C8B-B14F-4D97-AF65-F5344CB8AC3E}">
+        <p14:creationId xmlns:p14="http://schemas.microsoft.com/office/powerpoint/2010/main" val="3760681180"/>
+      </p:ext>
+    </p:extLst>
+  </p:cSld>
+  <p:clrMapOvr>
+    <a:masterClrMapping/>
+  </p:clrMapOvr>
+  <p:transition spd="slow">
+    <p:wipe/>
+  </p:transition>
+  <p:timing>
+    <p:tnLst>
+      <p:par>
+        <p:cTn id="1" dur="indefinite" restart="never" nodeType="tmRoot">
+          <p:childTnLst>
+            <p:seq concurrent="1" nextAc="seek">
+              <p:cTn id="2" dur="indefinite" nodeType="mainSeq">
+                <p:childTnLst>
+                  <p:par>
+                    <p:cTn id="3" fill="hold">
+                      <p:stCondLst>
+                        <p:cond delay="indefinite"/>
+                      </p:stCondLst>
+                      <p:childTnLst>
+                        <p:par>
+                          <p:cTn id="4" fill="hold">
+                            <p:stCondLst>
+                              <p:cond delay="0"/>
+                            </p:stCondLst>
+                            <p:childTnLst>
+                              <p:par>
+                                <p:cTn id="5" presetID="2" presetClass="entr" presetSubtype="4" fill="hold" nodeType="clickEffect">
+                                  <p:stCondLst>
+                                    <p:cond delay="0"/>
+                                  </p:stCondLst>
+                                  <p:childTnLst>
+                                    <p:set>
+                                      <p:cBhvr>
+                                        <p:cTn id="6" dur="1" fill="hold">
+                                          <p:stCondLst>
+                                            <p:cond delay="0"/>
+                                          </p:stCondLst>
+                                        </p:cTn>
+                                        <p:tgtEl>
+                                          <p:spTgt spid="5"/>
+                                        </p:tgtEl>
+                                        <p:attrNameLst>
+                                          <p:attrName>style.visibility</p:attrName>
+                                        </p:attrNameLst>
+                                      </p:cBhvr>
+                                      <p:to>
+                                        <p:strVal val="visible"/>
+                                      </p:to>
+                                    </p:set>
+                                    <p:anim calcmode="lin" valueType="num">
+                                      <p:cBhvr additive="base">
+                                        <p:cTn id="7" dur="500" fill="hold"/>
+                                        <p:tgtEl>
+                                          <p:spTgt spid="5"/>
+                                        </p:tgtEl>
+                                        <p:attrNameLst>
+                                          <p:attrName>ppt_x</p:attrName>
+                                        </p:attrNameLst>
+                                      </p:cBhvr>
+                                      <p:tavLst>
+                                        <p:tav tm="0">
+                                          <p:val>
+                                            <p:strVal val="#ppt_x"/>
+                                          </p:val>
+                                        </p:tav>
+                                        <p:tav tm="100000">
+                                          <p:val>
+                                            <p:strVal val="#ppt_x"/>
+                                          </p:val>
+                                        </p:tav>
+                                      </p:tavLst>
+                                    </p:anim>
+                                    <p:anim calcmode="lin" valueType="num">
+                                      <p:cBhvr additive="base">
+                                        <p:cTn id="8" dur="500" fill="hold"/>
+                                        <p:tgtEl>
+                                          <p:spTgt spid="5"/>
+                                        </p:tgtEl>
+                                        <p:attrNameLst>
+                                          <p:attrName>ppt_y</p:attrName>
+                                        </p:attrNameLst>
+                                      </p:cBhvr>
+                                      <p:tavLst>
+                                        <p:tav tm="0">
+                                          <p:val>
+                                            <p:strVal val="1+#ppt_h/2"/>
+                                          </p:val>
+                                        </p:tav>
+                                        <p:tav tm="100000">
+                                          <p:val>
+                                            <p:strVal val="#ppt_y"/>
+                                          </p:val>
+                                        </p:tav>
+                                      </p:tavLst>
+                                    </p:anim>
+                                  </p:childTnLst>
+                                </p:cTn>
+                              </p:par>
+                            </p:childTnLst>
+                          </p:cTn>
+                        </p:par>
+                      </p:childTnLst>
+                    </p:cTn>
+                  </p:par>
+                </p:childTnLst>
+              </p:cTn>
+              <p:prevCondLst>
+                <p:cond evt="onPrev" delay="0">
+                  <p:tgtEl>
+                    <p:sldTgt/>
+                  </p:tgtEl>
+                </p:cond>
+              </p:prevCondLst>
+              <p:nextCondLst>
+                <p:cond evt="onNext" delay="0">
+                  <p:tgtEl>
+                    <p:sldTgt/>
+                  </p:tgtEl>
+                </p:cond>
+              </p:nextCondLst>
+            </p:seq>
+          </p:childTnLst>
+        </p:cTn>
+      </p:par>
+    </p:tnLst>
+  </p:timing>
+</p:sld>
+</file>
+
+<file path=ppt/slides/slide3.xml><?xml version="1.0" encoding="utf-8"?>
+<p:sld xmlns:a="http://schemas.openxmlformats.org/drawingml/2006/main" xmlns:r="http://schemas.openxmlformats.org/officeDocument/2006/relationships" xmlns:p="http://schemas.openxmlformats.org/presentationml/2006/main">
+  <p:cSld>
+    <p:spTree>
+      <p:nvGrpSpPr>
+        <p:cNvPr id="1" name=""/>
+        <p:cNvGrpSpPr/>
+        <p:nvPr/>
+      </p:nvGrpSpPr>
+      <p:grpSpPr>
+        <a:xfrm>
+          <a:off x="0" y="0"/>
+          <a:ext cx="0" cy="0"/>
+          <a:chOff x="0" y="0"/>
+          <a:chExt cx="0" cy="0"/>
+        </a:xfrm>
+      </p:grpSpPr>
+      <p:pic>
+        <p:nvPicPr>
+          <p:cNvPr id="4" name="Marcador de contenido 3">
+            <a:extLst>
+              <a:ext uri="{FF2B5EF4-FFF2-40B4-BE49-F238E27FC236}">
+                <a16:creationId xmlns:a16="http://schemas.microsoft.com/office/drawing/2014/main" id="{9AB43B64-7A39-44E6-8243-8A3ACF1C8DE1}"/>
+              </a:ext>
+            </a:extLst>
+          </p:cNvPr>
+          <p:cNvPicPr>
+            <a:picLocks noGrp="1" noChangeAspect="1"/>
+          </p:cNvPicPr>
+          <p:nvPr>
+            <p:ph idx="1"/>
+          </p:nvPr>
+        </p:nvPicPr>
+        <p:blipFill>
+          <a:blip r:embed="rId2">
+            <a:extLst>
+              <a:ext uri="{28A0092B-C50C-407E-A947-70E740481C1C}">
+                <a14:useLocalDpi xmlns:a14="http://schemas.microsoft.com/office/drawing/2010/main" val="0"/>
+              </a:ext>
+            </a:extLst>
+          </a:blip>
+          <a:stretch>
+            <a:fillRect/>
+          </a:stretch>
+        </p:blipFill>
+        <p:spPr>
+          <a:xfrm>
+            <a:off x="898593" y="890587"/>
+            <a:ext cx="10394814" cy="5076825"/>
+          </a:xfrm>
+          <a:prstGeom prst="roundRect">
+            <a:avLst>
+              <a:gd name="adj" fmla="val 8594"/>
+            </a:avLst>
+          </a:prstGeom>
+          <a:solidFill>
+            <a:srgbClr val="FFFFFF">
+              <a:shade val="85000"/>
+            </a:srgbClr>
+          </a:solidFill>
+          <a:ln>
+            <a:noFill/>
+          </a:ln>
+          <a:effectLst>
+            <a:reflection blurRad="12700" stA="38000" endPos="28000" dist="5000" dir="5400000" sy="-100000" algn="bl" rotWithShape="0"/>
+          </a:effectLst>
+        </p:spPr>
+      </p:pic>
+      <p:sp>
+        <p:nvSpPr>
+          <p:cNvPr id="5" name="CuadroTexto 4">
+            <a:extLst>
+              <a:ext uri="{FF2B5EF4-FFF2-40B4-BE49-F238E27FC236}">
+                <a16:creationId xmlns:a16="http://schemas.microsoft.com/office/drawing/2014/main" id="{87307A0B-BE28-4909-AAC6-6117A9F08535}"/>
+              </a:ext>
+            </a:extLst>
+          </p:cNvPr>
+          <p:cNvSpPr txBox="1"/>
+          <p:nvPr/>
+        </p:nvSpPr>
+        <p:spPr>
+          <a:xfrm>
+            <a:off x="898593" y="521255"/>
+            <a:ext cx="10394814" cy="369332"/>
+          </a:xfrm>
+          <a:prstGeom prst="rect">
+            <a:avLst/>
+          </a:prstGeom>
+          <a:noFill/>
+        </p:spPr>
+        <p:txBody>
+          <a:bodyPr wrap="square" rtlCol="0">
+            <a:spAutoFit/>
+          </a:bodyPr>
+          <a:lstStyle/>
+          <a:p>
+            <a:pPr algn="ctr"/>
+            <a:r>
+              <a:rPr lang="es-AR" dirty="0"/>
+              <a:t>Diagrama Relacional</a:t>
+            </a:r>
+          </a:p>
+        </p:txBody>
+      </p:sp>
+    </p:spTree>
+    <p:extLst>
+      <p:ext uri="{BB962C8B-B14F-4D97-AF65-F5344CB8AC3E}">
+        <p14:creationId xmlns:p14="http://schemas.microsoft.com/office/powerpoint/2010/main" val="2705746565"/>
+      </p:ext>
+    </p:extLst>
+  </p:cSld>
+  <p:clrMapOvr>
+    <a:masterClrMapping/>
+  </p:clrMapOvr>
+  <p:transition spd="slow">
+    <p:wipe/>
+  </p:transition>
+  <p:timing>
+    <p:tnLst>
+      <p:par>
+        <p:cTn id="1" dur="indefinite" restart="never" nodeType="tmRoot">
+          <p:childTnLst>
+            <p:seq concurrent="1" nextAc="seek">
+              <p:cTn id="2" dur="indefinite" nodeType="mainSeq">
+                <p:childTnLst>
+                  <p:par>
+                    <p:cTn id="3" fill="hold">
+                      <p:stCondLst>
+                        <p:cond delay="indefinite"/>
+                      </p:stCondLst>
+                      <p:childTnLst>
+                        <p:par>
+                          <p:cTn id="4" fill="hold">
+                            <p:stCondLst>
+                              <p:cond delay="0"/>
+                            </p:stCondLst>
+                            <p:childTnLst>
+                              <p:par>
+                                <p:cTn id="5" presetID="2" presetClass="entr" presetSubtype="4" fill="hold" nodeType="clickEffect">
+                                  <p:stCondLst>
+                                    <p:cond delay="0"/>
+                                  </p:stCondLst>
+                                  <p:childTnLst>
+                                    <p:set>
+                                      <p:cBhvr>
+                                        <p:cTn id="6" dur="1" fill="hold">
+                                          <p:stCondLst>
+                                            <p:cond delay="0"/>
+                                          </p:stCondLst>
+                                        </p:cTn>
+                                        <p:tgtEl>
+                                          <p:spTgt spid="4"/>
+                                        </p:tgtEl>
+                                        <p:attrNameLst>
+                                          <p:attrName>style.visibility</p:attrName>
+                                        </p:attrNameLst>
+                                      </p:cBhvr>
+                                      <p:to>
+                                        <p:strVal val="visible"/>
+                                      </p:to>
+                                    </p:set>
+                                    <p:anim calcmode="lin" valueType="num">
+                                      <p:cBhvr additive="base">
+                                        <p:cTn id="7" dur="500" fill="hold"/>
+                                        <p:tgtEl>
+                                          <p:spTgt spid="4"/>
+                                        </p:tgtEl>
+                                        <p:attrNameLst>
+                                          <p:attrName>ppt_x</p:attrName>
+                                        </p:attrNameLst>
+                                      </p:cBhvr>
+                                      <p:tavLst>
+                                        <p:tav tm="0">
+                                          <p:val>
+                                            <p:strVal val="#ppt_x"/>
+                                          </p:val>
+                                        </p:tav>
+                                        <p:tav tm="100000">
+                                          <p:val>
+                                            <p:strVal val="#ppt_x"/>
+                                          </p:val>
+                                        </p:tav>
+                                      </p:tavLst>
+                                    </p:anim>
+                                    <p:anim calcmode="lin" valueType="num">
+                                      <p:cBhvr additive="base">
+                                        <p:cTn id="8" dur="500" fill="hold"/>
+                                        <p:tgtEl>
+                                          <p:spTgt spid="4"/>
+                                        </p:tgtEl>
+                                        <p:attrNameLst>
+                                          <p:attrName>ppt_y</p:attrName>
+                                        </p:attrNameLst>
+                                      </p:cBhvr>
+                                      <p:tavLst>
+                                        <p:tav tm="0">
+                                          <p:val>
+                                            <p:strVal val="1+#ppt_h/2"/>
+                                          </p:val>
+                                        </p:tav>
+                                        <p:tav tm="100000">
+                                          <p:val>
+                                            <p:strVal val="#ppt_y"/>
+                                          </p:val>
+                                        </p:tav>
+                                      </p:tavLst>
+                                    </p:anim>
+                                  </p:childTnLst>
+                                </p:cTn>
+                              </p:par>
+                            </p:childTnLst>
+                          </p:cTn>
+                        </p:par>
+                      </p:childTnLst>
+                    </p:cTn>
+                  </p:par>
+                </p:childTnLst>
+              </p:cTn>
+              <p:prevCondLst>
+                <p:cond evt="onPrev" delay="0">
+                  <p:tgtEl>
+                    <p:sldTgt/>
+                  </p:tgtEl>
+                </p:cond>
+              </p:prevCondLst>
+              <p:nextCondLst>
+                <p:cond evt="onNext" delay="0">
+                  <p:tgtEl>
+                    <p:sldTgt/>
+                  </p:tgtEl>
+                </p:cond>
+              </p:nextCondLst>
+            </p:seq>
+          </p:childTnLst>
+        </p:cTn>
+      </p:par>
+    </p:tnLst>
+  </p:timing>
+</p:sld>
+</file>
+
+<file path=ppt/slides/slide4.xml><?xml version="1.0" encoding="utf-8"?>
 <p:sld xmlns:a="http://schemas.openxmlformats.org/drawingml/2006/main" xmlns:r="http://schemas.openxmlformats.org/officeDocument/2006/relationships" xmlns:p="http://schemas.openxmlformats.org/presentationml/2006/main">
   <p:cSld>
     <p:spTree>
@@ -12399,10 +12470,184 @@
   <p:clrMapOvr>
     <a:masterClrMapping/>
   </p:clrMapOvr>
+  <p:transition spd="slow">
+    <p:wipe/>
+  </p:transition>
+  <p:timing>
+    <p:tnLst>
+      <p:par>
+        <p:cTn id="1" dur="indefinite" restart="never" nodeType="tmRoot">
+          <p:childTnLst>
+            <p:seq concurrent="1" nextAc="seek">
+              <p:cTn id="2" dur="indefinite" nodeType="mainSeq">
+                <p:childTnLst>
+                  <p:par>
+                    <p:cTn id="3" fill="hold">
+                      <p:stCondLst>
+                        <p:cond delay="indefinite"/>
+                      </p:stCondLst>
+                      <p:childTnLst>
+                        <p:par>
+                          <p:cTn id="4" fill="hold">
+                            <p:stCondLst>
+                              <p:cond delay="0"/>
+                            </p:stCondLst>
+                            <p:childTnLst>
+                              <p:par>
+                                <p:cTn id="5" presetID="1" presetClass="entr" presetSubtype="0" fill="hold" grpId="0" nodeType="clickEffect">
+                                  <p:stCondLst>
+                                    <p:cond delay="0"/>
+                                  </p:stCondLst>
+                                  <p:childTnLst>
+                                    <p:set>
+                                      <p:cBhvr>
+                                        <p:cTn id="6" dur="1" fill="hold">
+                                          <p:stCondLst>
+                                            <p:cond delay="0"/>
+                                          </p:stCondLst>
+                                        </p:cTn>
+                                        <p:tgtEl>
+                                          <p:spTgt spid="7"/>
+                                        </p:tgtEl>
+                                        <p:attrNameLst>
+                                          <p:attrName>style.visibility</p:attrName>
+                                        </p:attrNameLst>
+                                      </p:cBhvr>
+                                      <p:to>
+                                        <p:strVal val="visible"/>
+                                      </p:to>
+                                    </p:set>
+                                  </p:childTnLst>
+                                </p:cTn>
+                              </p:par>
+                            </p:childTnLst>
+                          </p:cTn>
+                        </p:par>
+                      </p:childTnLst>
+                    </p:cTn>
+                  </p:par>
+                  <p:par>
+                    <p:cTn id="7" fill="hold">
+                      <p:stCondLst>
+                        <p:cond delay="indefinite"/>
+                      </p:stCondLst>
+                      <p:childTnLst>
+                        <p:par>
+                          <p:cTn id="8" fill="hold">
+                            <p:stCondLst>
+                              <p:cond delay="0"/>
+                            </p:stCondLst>
+                            <p:childTnLst>
+                              <p:par>
+                                <p:cTn id="9" presetID="2" presetClass="entr" presetSubtype="4" fill="hold" nodeType="clickEffect">
+                                  <p:stCondLst>
+                                    <p:cond delay="0"/>
+                                  </p:stCondLst>
+                                  <p:childTnLst>
+                                    <p:set>
+                                      <p:cBhvr>
+                                        <p:cTn id="10" dur="1" fill="hold">
+                                          <p:stCondLst>
+                                            <p:cond delay="0"/>
+                                          </p:stCondLst>
+                                        </p:cTn>
+                                        <p:tgtEl>
+                                          <p:spTgt spid="4"/>
+                                        </p:tgtEl>
+                                        <p:attrNameLst>
+                                          <p:attrName>style.visibility</p:attrName>
+                                        </p:attrNameLst>
+                                      </p:cBhvr>
+                                      <p:to>
+                                        <p:strVal val="visible"/>
+                                      </p:to>
+                                    </p:set>
+                                    <p:anim calcmode="lin" valueType="num">
+                                      <p:cBhvr additive="base">
+                                        <p:cTn id="11" dur="500" fill="hold"/>
+                                        <p:tgtEl>
+                                          <p:spTgt spid="4"/>
+                                        </p:tgtEl>
+                                        <p:attrNameLst>
+                                          <p:attrName>ppt_x</p:attrName>
+                                        </p:attrNameLst>
+                                      </p:cBhvr>
+                                      <p:tavLst>
+                                        <p:tav tm="0">
+                                          <p:val>
+                                            <p:strVal val="#ppt_x"/>
+                                          </p:val>
+                                        </p:tav>
+                                        <p:tav tm="100000">
+                                          <p:val>
+                                            <p:strVal val="#ppt_x"/>
+                                          </p:val>
+                                        </p:tav>
+                                      </p:tavLst>
+                                    </p:anim>
+                                    <p:anim calcmode="lin" valueType="num">
+                                      <p:cBhvr additive="base">
+                                        <p:cTn id="12" dur="500" fill="hold"/>
+                                        <p:tgtEl>
+                                          <p:spTgt spid="4"/>
+                                        </p:tgtEl>
+                                        <p:attrNameLst>
+                                          <p:attrName>ppt_y</p:attrName>
+                                        </p:attrNameLst>
+                                      </p:cBhvr>
+                                      <p:tavLst>
+                                        <p:tav tm="0">
+                                          <p:val>
+                                            <p:strVal val="1+#ppt_h/2"/>
+                                          </p:val>
+                                        </p:tav>
+                                        <p:tav tm="100000">
+                                          <p:val>
+                                            <p:strVal val="#ppt_y"/>
+                                          </p:val>
+                                        </p:tav>
+                                      </p:tavLst>
+                                    </p:anim>
+                                  </p:childTnLst>
+                                </p:cTn>
+                              </p:par>
+                            </p:childTnLst>
+                          </p:cTn>
+                        </p:par>
+                      </p:childTnLst>
+                    </p:cTn>
+                  </p:par>
+                </p:childTnLst>
+              </p:cTn>
+              <p:prevCondLst>
+                <p:cond evt="onPrev" delay="0">
+                  <p:tgtEl>
+                    <p:sldTgt/>
+                  </p:tgtEl>
+                </p:cond>
+              </p:prevCondLst>
+              <p:nextCondLst>
+                <p:cond evt="onNext" delay="0">
+                  <p:tgtEl>
+                    <p:sldTgt/>
+                  </p:tgtEl>
+                </p:cond>
+              </p:nextCondLst>
+            </p:seq>
+          </p:childTnLst>
+        </p:cTn>
+      </p:par>
+    </p:tnLst>
+    <p:bldLst>
+      <p:bldGraphic spid="7" grpId="0">
+        <p:bldAsOne/>
+      </p:bldGraphic>
+    </p:bldLst>
+  </p:timing>
 </p:sld>
 </file>
 
-<file path=ppt/slides/slide3.xml><?xml version="1.0" encoding="utf-8"?>
+<file path=ppt/slides/slide5.xml><?xml version="1.0" encoding="utf-8"?>
 <p:sld xmlns:a="http://schemas.openxmlformats.org/drawingml/2006/main" xmlns:r="http://schemas.openxmlformats.org/officeDocument/2006/relationships" xmlns:p="http://schemas.openxmlformats.org/presentationml/2006/main">
   <p:cSld>
     <p:bg>
@@ -12537,13 +12782,13 @@
               </a:lnSpc>
             </a:pPr>
             <a:r>
-              <a:rPr lang="es-ES" sz="5600">
+              <a:rPr lang="es-ES" sz="5600" dirty="0">
                 <a:ea typeface="+mj-lt"/>
                 <a:cs typeface="+mj-lt"/>
               </a:rPr>
               <a:t>Automatización de Reglas y Control de Integridad</a:t>
             </a:r>
-            <a:endParaRPr lang="es-ES" sz="5600"/>
+            <a:endParaRPr lang="es-ES" sz="5600" dirty="0"/>
           </a:p>
         </p:txBody>
       </p:sp>
@@ -12731,7 +12976,7 @@
               </a:lnSpc>
               <a:buNone/>
             </a:pPr>
-            <a:endParaRPr lang="es-ES" sz="1600"/>
+            <a:endParaRPr lang="es-ES" sz="1600" dirty="0"/>
           </a:p>
         </p:txBody>
       </p:sp>
@@ -12922,10 +13167,193 @@
   <p:clrMapOvr>
     <a:masterClrMapping/>
   </p:clrMapOvr>
+  <p:transition spd="slow">
+    <p:wipe/>
+  </p:transition>
+  <p:timing>
+    <p:tnLst>
+      <p:par>
+        <p:cTn id="1" dur="indefinite" restart="never" nodeType="tmRoot">
+          <p:childTnLst>
+            <p:seq concurrent="1" nextAc="seek">
+              <p:cTn id="2" dur="indefinite" nodeType="mainSeq">
+                <p:childTnLst>
+                  <p:par>
+                    <p:cTn id="3" fill="hold">
+                      <p:stCondLst>
+                        <p:cond delay="indefinite"/>
+                      </p:stCondLst>
+                      <p:childTnLst>
+                        <p:par>
+                          <p:cTn id="4" fill="hold">
+                            <p:stCondLst>
+                              <p:cond delay="0"/>
+                            </p:stCondLst>
+                            <p:childTnLst>
+                              <p:par>
+                                <p:cTn id="5" presetID="1" presetClass="entr" presetSubtype="0" fill="hold" grpId="0" nodeType="clickEffect">
+                                  <p:stCondLst>
+                                    <p:cond delay="0"/>
+                                  </p:stCondLst>
+                                  <p:childTnLst>
+                                    <p:set>
+                                      <p:cBhvr>
+                                        <p:cTn id="6" dur="1" fill="hold">
+                                          <p:stCondLst>
+                                            <p:cond delay="0"/>
+                                          </p:stCondLst>
+                                        </p:cTn>
+                                        <p:tgtEl>
+                                          <p:spTgt spid="3">
+                                            <p:txEl>
+                                              <p:pRg st="0" end="0"/>
+                                            </p:txEl>
+                                          </p:spTgt>
+                                        </p:tgtEl>
+                                        <p:attrNameLst>
+                                          <p:attrName>style.visibility</p:attrName>
+                                        </p:attrNameLst>
+                                      </p:cBhvr>
+                                      <p:to>
+                                        <p:strVal val="visible"/>
+                                      </p:to>
+                                    </p:set>
+                                  </p:childTnLst>
+                                </p:cTn>
+                              </p:par>
+                            </p:childTnLst>
+                          </p:cTn>
+                        </p:par>
+                      </p:childTnLst>
+                    </p:cTn>
+                  </p:par>
+                  <p:par>
+                    <p:cTn id="7" fill="hold">
+                      <p:stCondLst>
+                        <p:cond delay="indefinite"/>
+                      </p:stCondLst>
+                      <p:childTnLst>
+                        <p:par>
+                          <p:cTn id="8" fill="hold">
+                            <p:stCondLst>
+                              <p:cond delay="0"/>
+                            </p:stCondLst>
+                            <p:childTnLst>
+                              <p:par>
+                                <p:cTn id="9" presetID="1" presetClass="entr" presetSubtype="0" fill="hold" grpId="0" nodeType="clickEffect">
+                                  <p:stCondLst>
+                                    <p:cond delay="0"/>
+                                  </p:stCondLst>
+                                  <p:childTnLst>
+                                    <p:set>
+                                      <p:cBhvr>
+                                        <p:cTn id="10" dur="1" fill="hold">
+                                          <p:stCondLst>
+                                            <p:cond delay="0"/>
+                                          </p:stCondLst>
+                                        </p:cTn>
+                                        <p:tgtEl>
+                                          <p:spTgt spid="3">
+                                            <p:txEl>
+                                              <p:pRg st="1" end="1"/>
+                                            </p:txEl>
+                                          </p:spTgt>
+                                        </p:tgtEl>
+                                        <p:attrNameLst>
+                                          <p:attrName>style.visibility</p:attrName>
+                                        </p:attrNameLst>
+                                      </p:cBhvr>
+                                      <p:to>
+                                        <p:strVal val="visible"/>
+                                      </p:to>
+                                    </p:set>
+                                  </p:childTnLst>
+                                </p:cTn>
+                              </p:par>
+                            </p:childTnLst>
+                          </p:cTn>
+                        </p:par>
+                      </p:childTnLst>
+                    </p:cTn>
+                  </p:par>
+                  <p:par>
+                    <p:cTn id="11" fill="hold">
+                      <p:stCondLst>
+                        <p:cond delay="indefinite"/>
+                      </p:stCondLst>
+                      <p:childTnLst>
+                        <p:par>
+                          <p:cTn id="12" fill="hold">
+                            <p:stCondLst>
+                              <p:cond delay="0"/>
+                            </p:stCondLst>
+                            <p:childTnLst>
+                              <p:par>
+                                <p:cTn id="13" presetID="1" presetClass="entr" presetSubtype="0" fill="hold" grpId="0" nodeType="clickEffect">
+                                  <p:stCondLst>
+                                    <p:cond delay="0"/>
+                                  </p:stCondLst>
+                                  <p:childTnLst>
+                                    <p:set>
+                                      <p:cBhvr>
+                                        <p:cTn id="14" dur="1" fill="hold">
+                                          <p:stCondLst>
+                                            <p:cond delay="0"/>
+                                          </p:stCondLst>
+                                        </p:cTn>
+                                        <p:tgtEl>
+                                          <p:spTgt spid="3">
+                                            <p:txEl>
+                                              <p:pRg st="2" end="2"/>
+                                            </p:txEl>
+                                          </p:spTgt>
+                                        </p:tgtEl>
+                                        <p:attrNameLst>
+                                          <p:attrName>style.visibility</p:attrName>
+                                        </p:attrNameLst>
+                                      </p:cBhvr>
+                                      <p:to>
+                                        <p:strVal val="visible"/>
+                                      </p:to>
+                                    </p:set>
+                                  </p:childTnLst>
+                                </p:cTn>
+                              </p:par>
+                            </p:childTnLst>
+                          </p:cTn>
+                        </p:par>
+                      </p:childTnLst>
+                    </p:cTn>
+                  </p:par>
+                </p:childTnLst>
+              </p:cTn>
+              <p:prevCondLst>
+                <p:cond evt="onPrev" delay="0">
+                  <p:tgtEl>
+                    <p:sldTgt/>
+                  </p:tgtEl>
+                </p:cond>
+              </p:prevCondLst>
+              <p:nextCondLst>
+                <p:cond evt="onNext" delay="0">
+                  <p:tgtEl>
+                    <p:sldTgt/>
+                  </p:tgtEl>
+                </p:cond>
+              </p:nextCondLst>
+            </p:seq>
+          </p:childTnLst>
+        </p:cTn>
+      </p:par>
+    </p:tnLst>
+    <p:bldLst>
+      <p:bldP spid="3" grpId="0" build="p"/>
+    </p:bldLst>
+  </p:timing>
 </p:sld>
 </file>
 
-<file path=ppt/slides/slide4.xml><?xml version="1.0" encoding="utf-8"?>
+<file path=ppt/slides/slide6.xml><?xml version="1.0" encoding="utf-8"?>
 <p:sld xmlns:a="http://schemas.openxmlformats.org/drawingml/2006/main" xmlns:r="http://schemas.openxmlformats.org/officeDocument/2006/relationships" xmlns:p="http://schemas.openxmlformats.org/presentationml/2006/main">
   <p:cSld>
     <p:bg>
@@ -13856,7 +14284,7 @@
               </a:rPr>
               <a:t>) para cuantificar reservas atendidas por cada empleado.</a:t>
             </a:r>
-            <a:endParaRPr lang="es-ES" sz="1900"/>
+            <a:endParaRPr lang="es-ES" sz="1900" dirty="0"/>
           </a:p>
         </p:txBody>
       </p:sp>
@@ -13870,10 +14298,193 @@
   <p:clrMapOvr>
     <a:masterClrMapping/>
   </p:clrMapOvr>
+  <p:transition spd="slow">
+    <p:wipe/>
+  </p:transition>
+  <p:timing>
+    <p:tnLst>
+      <p:par>
+        <p:cTn id="1" dur="indefinite" restart="never" nodeType="tmRoot">
+          <p:childTnLst>
+            <p:seq concurrent="1" nextAc="seek">
+              <p:cTn id="2" dur="indefinite" nodeType="mainSeq">
+                <p:childTnLst>
+                  <p:par>
+                    <p:cTn id="3" fill="hold">
+                      <p:stCondLst>
+                        <p:cond delay="indefinite"/>
+                      </p:stCondLst>
+                      <p:childTnLst>
+                        <p:par>
+                          <p:cTn id="4" fill="hold">
+                            <p:stCondLst>
+                              <p:cond delay="0"/>
+                            </p:stCondLst>
+                            <p:childTnLst>
+                              <p:par>
+                                <p:cTn id="5" presetID="1" presetClass="entr" presetSubtype="0" fill="hold" grpId="0" nodeType="clickEffect">
+                                  <p:stCondLst>
+                                    <p:cond delay="0"/>
+                                  </p:stCondLst>
+                                  <p:childTnLst>
+                                    <p:set>
+                                      <p:cBhvr>
+                                        <p:cTn id="6" dur="1" fill="hold">
+                                          <p:stCondLst>
+                                            <p:cond delay="0"/>
+                                          </p:stCondLst>
+                                        </p:cTn>
+                                        <p:tgtEl>
+                                          <p:spTgt spid="3">
+                                            <p:txEl>
+                                              <p:pRg st="0" end="0"/>
+                                            </p:txEl>
+                                          </p:spTgt>
+                                        </p:tgtEl>
+                                        <p:attrNameLst>
+                                          <p:attrName>style.visibility</p:attrName>
+                                        </p:attrNameLst>
+                                      </p:cBhvr>
+                                      <p:to>
+                                        <p:strVal val="visible"/>
+                                      </p:to>
+                                    </p:set>
+                                  </p:childTnLst>
+                                </p:cTn>
+                              </p:par>
+                            </p:childTnLst>
+                          </p:cTn>
+                        </p:par>
+                      </p:childTnLst>
+                    </p:cTn>
+                  </p:par>
+                  <p:par>
+                    <p:cTn id="7" fill="hold">
+                      <p:stCondLst>
+                        <p:cond delay="indefinite"/>
+                      </p:stCondLst>
+                      <p:childTnLst>
+                        <p:par>
+                          <p:cTn id="8" fill="hold">
+                            <p:stCondLst>
+                              <p:cond delay="0"/>
+                            </p:stCondLst>
+                            <p:childTnLst>
+                              <p:par>
+                                <p:cTn id="9" presetID="1" presetClass="entr" presetSubtype="0" fill="hold" grpId="0" nodeType="clickEffect">
+                                  <p:stCondLst>
+                                    <p:cond delay="0"/>
+                                  </p:stCondLst>
+                                  <p:childTnLst>
+                                    <p:set>
+                                      <p:cBhvr>
+                                        <p:cTn id="10" dur="1" fill="hold">
+                                          <p:stCondLst>
+                                            <p:cond delay="0"/>
+                                          </p:stCondLst>
+                                        </p:cTn>
+                                        <p:tgtEl>
+                                          <p:spTgt spid="3">
+                                            <p:txEl>
+                                              <p:pRg st="1" end="1"/>
+                                            </p:txEl>
+                                          </p:spTgt>
+                                        </p:tgtEl>
+                                        <p:attrNameLst>
+                                          <p:attrName>style.visibility</p:attrName>
+                                        </p:attrNameLst>
+                                      </p:cBhvr>
+                                      <p:to>
+                                        <p:strVal val="visible"/>
+                                      </p:to>
+                                    </p:set>
+                                  </p:childTnLst>
+                                </p:cTn>
+                              </p:par>
+                            </p:childTnLst>
+                          </p:cTn>
+                        </p:par>
+                      </p:childTnLst>
+                    </p:cTn>
+                  </p:par>
+                  <p:par>
+                    <p:cTn id="11" fill="hold">
+                      <p:stCondLst>
+                        <p:cond delay="indefinite"/>
+                      </p:stCondLst>
+                      <p:childTnLst>
+                        <p:par>
+                          <p:cTn id="12" fill="hold">
+                            <p:stCondLst>
+                              <p:cond delay="0"/>
+                            </p:stCondLst>
+                            <p:childTnLst>
+                              <p:par>
+                                <p:cTn id="13" presetID="1" presetClass="entr" presetSubtype="0" fill="hold" grpId="0" nodeType="clickEffect">
+                                  <p:stCondLst>
+                                    <p:cond delay="0"/>
+                                  </p:stCondLst>
+                                  <p:childTnLst>
+                                    <p:set>
+                                      <p:cBhvr>
+                                        <p:cTn id="14" dur="1" fill="hold">
+                                          <p:stCondLst>
+                                            <p:cond delay="0"/>
+                                          </p:stCondLst>
+                                        </p:cTn>
+                                        <p:tgtEl>
+                                          <p:spTgt spid="3">
+                                            <p:txEl>
+                                              <p:pRg st="2" end="2"/>
+                                            </p:txEl>
+                                          </p:spTgt>
+                                        </p:tgtEl>
+                                        <p:attrNameLst>
+                                          <p:attrName>style.visibility</p:attrName>
+                                        </p:attrNameLst>
+                                      </p:cBhvr>
+                                      <p:to>
+                                        <p:strVal val="visible"/>
+                                      </p:to>
+                                    </p:set>
+                                  </p:childTnLst>
+                                </p:cTn>
+                              </p:par>
+                            </p:childTnLst>
+                          </p:cTn>
+                        </p:par>
+                      </p:childTnLst>
+                    </p:cTn>
+                  </p:par>
+                </p:childTnLst>
+              </p:cTn>
+              <p:prevCondLst>
+                <p:cond evt="onPrev" delay="0">
+                  <p:tgtEl>
+                    <p:sldTgt/>
+                  </p:tgtEl>
+                </p:cond>
+              </p:prevCondLst>
+              <p:nextCondLst>
+                <p:cond evt="onNext" delay="0">
+                  <p:tgtEl>
+                    <p:sldTgt/>
+                  </p:tgtEl>
+                </p:cond>
+              </p:nextCondLst>
+            </p:seq>
+          </p:childTnLst>
+        </p:cTn>
+      </p:par>
+    </p:tnLst>
+    <p:bldLst>
+      <p:bldP spid="3" grpId="0" build="p"/>
+    </p:bldLst>
+  </p:timing>
 </p:sld>
 </file>
 
-<file path=ppt/slides/slide5.xml><?xml version="1.0" encoding="utf-8"?>
+<file path=ppt/slides/slide7.xml><?xml version="1.0" encoding="utf-8"?>
 <p:sld xmlns:a="http://schemas.openxmlformats.org/drawingml/2006/main" xmlns:r="http://schemas.openxmlformats.org/officeDocument/2006/relationships" xmlns:p="http://schemas.openxmlformats.org/presentationml/2006/main">
   <p:cSld>
     <p:spTree>
@@ -14062,6 +14673,189 @@
   <p:clrMapOvr>
     <a:masterClrMapping/>
   </p:clrMapOvr>
+  <p:transition spd="slow">
+    <p:wipe/>
+  </p:transition>
+  <p:timing>
+    <p:tnLst>
+      <p:par>
+        <p:cTn id="1" dur="indefinite" restart="never" nodeType="tmRoot">
+          <p:childTnLst>
+            <p:seq concurrent="1" nextAc="seek">
+              <p:cTn id="2" dur="indefinite" nodeType="mainSeq">
+                <p:childTnLst>
+                  <p:par>
+                    <p:cTn id="3" fill="hold">
+                      <p:stCondLst>
+                        <p:cond delay="indefinite"/>
+                      </p:stCondLst>
+                      <p:childTnLst>
+                        <p:par>
+                          <p:cTn id="4" fill="hold">
+                            <p:stCondLst>
+                              <p:cond delay="0"/>
+                            </p:stCondLst>
+                            <p:childTnLst>
+                              <p:par>
+                                <p:cTn id="5" presetID="1" presetClass="entr" presetSubtype="0" fill="hold" grpId="0" nodeType="clickEffect">
+                                  <p:stCondLst>
+                                    <p:cond delay="0"/>
+                                  </p:stCondLst>
+                                  <p:childTnLst>
+                                    <p:set>
+                                      <p:cBhvr>
+                                        <p:cTn id="6" dur="1" fill="hold">
+                                          <p:stCondLst>
+                                            <p:cond delay="0"/>
+                                          </p:stCondLst>
+                                        </p:cTn>
+                                        <p:tgtEl>
+                                          <p:spTgt spid="3">
+                                            <p:txEl>
+                                              <p:pRg st="0" end="0"/>
+                                            </p:txEl>
+                                          </p:spTgt>
+                                        </p:tgtEl>
+                                        <p:attrNameLst>
+                                          <p:attrName>style.visibility</p:attrName>
+                                        </p:attrNameLst>
+                                      </p:cBhvr>
+                                      <p:to>
+                                        <p:strVal val="visible"/>
+                                      </p:to>
+                                    </p:set>
+                                  </p:childTnLst>
+                                </p:cTn>
+                              </p:par>
+                            </p:childTnLst>
+                          </p:cTn>
+                        </p:par>
+                      </p:childTnLst>
+                    </p:cTn>
+                  </p:par>
+                  <p:par>
+                    <p:cTn id="7" fill="hold">
+                      <p:stCondLst>
+                        <p:cond delay="indefinite"/>
+                      </p:stCondLst>
+                      <p:childTnLst>
+                        <p:par>
+                          <p:cTn id="8" fill="hold">
+                            <p:stCondLst>
+                              <p:cond delay="0"/>
+                            </p:stCondLst>
+                            <p:childTnLst>
+                              <p:par>
+                                <p:cTn id="9" presetID="1" presetClass="entr" presetSubtype="0" fill="hold" grpId="0" nodeType="clickEffect">
+                                  <p:stCondLst>
+                                    <p:cond delay="0"/>
+                                  </p:stCondLst>
+                                  <p:childTnLst>
+                                    <p:set>
+                                      <p:cBhvr>
+                                        <p:cTn id="10" dur="1" fill="hold">
+                                          <p:stCondLst>
+                                            <p:cond delay="0"/>
+                                          </p:stCondLst>
+                                        </p:cTn>
+                                        <p:tgtEl>
+                                          <p:spTgt spid="3">
+                                            <p:txEl>
+                                              <p:pRg st="1" end="1"/>
+                                            </p:txEl>
+                                          </p:spTgt>
+                                        </p:tgtEl>
+                                        <p:attrNameLst>
+                                          <p:attrName>style.visibility</p:attrName>
+                                        </p:attrNameLst>
+                                      </p:cBhvr>
+                                      <p:to>
+                                        <p:strVal val="visible"/>
+                                      </p:to>
+                                    </p:set>
+                                  </p:childTnLst>
+                                </p:cTn>
+                              </p:par>
+                            </p:childTnLst>
+                          </p:cTn>
+                        </p:par>
+                      </p:childTnLst>
+                    </p:cTn>
+                  </p:par>
+                  <p:par>
+                    <p:cTn id="11" fill="hold">
+                      <p:stCondLst>
+                        <p:cond delay="indefinite"/>
+                      </p:stCondLst>
+                      <p:childTnLst>
+                        <p:par>
+                          <p:cTn id="12" fill="hold">
+                            <p:stCondLst>
+                              <p:cond delay="0"/>
+                            </p:stCondLst>
+                            <p:childTnLst>
+                              <p:par>
+                                <p:cTn id="13" presetID="1" presetClass="entr" presetSubtype="0" fill="hold" grpId="0" nodeType="clickEffect">
+                                  <p:stCondLst>
+                                    <p:cond delay="0"/>
+                                  </p:stCondLst>
+                                  <p:childTnLst>
+                                    <p:set>
+                                      <p:cBhvr>
+                                        <p:cTn id="14" dur="1" fill="hold">
+                                          <p:stCondLst>
+                                            <p:cond delay="0"/>
+                                          </p:stCondLst>
+                                        </p:cTn>
+                                        <p:tgtEl>
+                                          <p:spTgt spid="3">
+                                            <p:txEl>
+                                              <p:pRg st="2" end="2"/>
+                                            </p:txEl>
+                                          </p:spTgt>
+                                        </p:tgtEl>
+                                        <p:attrNameLst>
+                                          <p:attrName>style.visibility</p:attrName>
+                                        </p:attrNameLst>
+                                      </p:cBhvr>
+                                      <p:to>
+                                        <p:strVal val="visible"/>
+                                      </p:to>
+                                    </p:set>
+                                  </p:childTnLst>
+                                </p:cTn>
+                              </p:par>
+                            </p:childTnLst>
+                          </p:cTn>
+                        </p:par>
+                      </p:childTnLst>
+                    </p:cTn>
+                  </p:par>
+                </p:childTnLst>
+              </p:cTn>
+              <p:prevCondLst>
+                <p:cond evt="onPrev" delay="0">
+                  <p:tgtEl>
+                    <p:sldTgt/>
+                  </p:tgtEl>
+                </p:cond>
+              </p:prevCondLst>
+              <p:nextCondLst>
+                <p:cond evt="onNext" delay="0">
+                  <p:tgtEl>
+                    <p:sldTgt/>
+                  </p:tgtEl>
+                </p:cond>
+              </p:nextCondLst>
+            </p:seq>
+          </p:childTnLst>
+        </p:cTn>
+      </p:par>
+    </p:tnLst>
+    <p:bldLst>
+      <p:bldP spid="3" grpId="0" build="p"/>
+    </p:bldLst>
+  </p:timing>
 </p:sld>
 </file>
 

</xml_diff>